<commit_message>
docs: update words in presentation file
</commit_message>
<xml_diff>
--- a/docs/presentation.pptx
+++ b/docs/presentation.pptx
@@ -4941,31 +4941,7 @@
                 <a:ea typeface="Cascadia Code" panose="020B0609020000020004" pitchFamily="49" charset="0"/>
                 <a:cs typeface="Cascadia Code" panose="020B0609020000020004" pitchFamily="49" charset="0"/>
               </a:rPr>
-              <a:t>"O desafio que move a Saúde </a:t>
-            </a:r>
-            <a:r>
-              <a:rPr lang="pt-BR" sz="1200" b="0" dirty="0" err="1">
-                <a:solidFill>
-                  <a:srgbClr val="CE9178"/>
-                </a:solidFill>
-                <a:effectLst/>
-                <a:latin typeface="Cascadia Code" panose="020B0609020000020004" pitchFamily="49" charset="0"/>
-                <a:ea typeface="Cascadia Code" panose="020B0609020000020004" pitchFamily="49" charset="0"/>
-                <a:cs typeface="Cascadia Code" panose="020B0609020000020004" pitchFamily="49" charset="0"/>
-              </a:rPr>
-              <a:t>iD</a:t>
-            </a:r>
-            <a:r>
-              <a:rPr lang="pt-BR" sz="1200" b="0" dirty="0">
-                <a:solidFill>
-                  <a:srgbClr val="CE9178"/>
-                </a:solidFill>
-                <a:effectLst/>
-                <a:latin typeface="Cascadia Code" panose="020B0609020000020004" pitchFamily="49" charset="0"/>
-                <a:ea typeface="Cascadia Code" panose="020B0609020000020004" pitchFamily="49" charset="0"/>
-                <a:cs typeface="Cascadia Code" panose="020B0609020000020004" pitchFamily="49" charset="0"/>
-              </a:rPr>
-              <a:t> ....”</a:t>
+              <a:t>"O desafio que move ....”</a:t>
             </a:r>
             <a:endParaRPr lang="pt-BR" sz="1200" b="0" dirty="0">
               <a:solidFill>

</xml_diff>